<commit_message>
Minor fixes on exercises
</commit_message>
<xml_diff>
--- a/Courses/Computer-Modeling-and-IT/Computer-Modeling-and-IT-5-Class/26-Introduction-to-Spreadsheets/26-Introduction-to-Spreadsheets.pptx
+++ b/Courses/Computer-Modeling-and-IT/Computer-Modeling-and-IT-5-Class/26-Introduction-to-Spreadsheets/26-Introduction-to-Spreadsheets.pptx
@@ -297,7 +297,7 @@
           <a:p>
             <a:fld id="{4E087215-0C8F-4762-A664-737A353EC9A4}" type="datetimeFigureOut">
               <a:rPr lang="bg-BG" smtClean="0"/>
-              <a:t>27.2.2024 г.</a:t>
+              <a:t>27.02.24 г.</a:t>
             </a:fld>
             <a:endParaRPr lang="bg-BG"/>
           </a:p>
@@ -493,7 +493,7 @@
           <a:p>
             <a:fld id="{72D84649-876A-46C9-8472-14CB09C070D8}" type="datetimeFigureOut">
               <a:rPr lang="en-US" smtClean="0"/>
-              <a:t>2/27/2024</a:t>
+              <a:t>2/27/24</a:t>
             </a:fld>
             <a:endParaRPr lang="en-US"/>
           </a:p>
@@ -9192,13 +9192,6 @@
       <p:transition spd="slow" advClick="0" advTm="5000"/>
     </mc:Fallback>
   </mc:AlternateContent>
-  <p:timing>
-    <p:tnLst>
-      <p:par>
-        <p:cTn id="1" dur="indefinite" restart="never" nodeType="tmRoot"/>
-      </p:par>
-    </p:tnLst>
-  </p:timing>
 </p:sld>
 </file>
 
@@ -10064,23 +10057,15 @@
           <a:p>
             <a:r>
               <a:rPr lang="bg-BG" sz="4000" dirty="0"/>
-              <a:t>Маркиране на </a:t>
-            </a:r>
-            <a:r>
-              <a:rPr lang="bg-BG" sz="4000" dirty="0" smtClean="0"/>
-              <a:t>клетки</a:t>
-            </a:r>
-            <a:r>
-              <a:rPr lang="en-US" sz="4000" dirty="0" smtClean="0"/>
+              <a:t>Маркиране на клетки</a:t>
+            </a:r>
+            <a:r>
+              <a:rPr lang="en-US" sz="4000" dirty="0"/>
               <a:t> – </a:t>
             </a:r>
             <a:r>
               <a:rPr lang="bg-BG" sz="4000" dirty="0"/>
-              <a:t>в</a:t>
-            </a:r>
-            <a:r>
-              <a:rPr lang="bg-BG" sz="4000" dirty="0" smtClean="0"/>
-              <a:t>идео</a:t>
+              <a:t>видео</a:t>
             </a:r>
             <a:endParaRPr lang="en-US" dirty="0"/>
           </a:p>
@@ -10141,13 +10126,6 @@
       <p:transition spd="slow" advClick="0" advTm="5000"/>
     </mc:Fallback>
   </mc:AlternateContent>
-  <p:timing>
-    <p:tnLst>
-      <p:par>
-        <p:cTn id="1" dur="indefinite" restart="never" nodeType="tmRoot"/>
-      </p:par>
-    </p:tnLst>
-  </p:timing>
 </p:sld>
 </file>
 
@@ -13218,7 +13196,7 @@
                 <a:hlinkClick r:id="rId3">
                   <a:extLst>
                     <a:ext uri="{A12FA001-AC4F-418D-AE19-62706E023703}">
-                      <ahyp:hlinkClr xmlns:ahyp="http://schemas.microsoft.com/office/drawing/2018/hyperlinkcolor" xmlns="" val="tx"/>
+                      <ahyp:hlinkClr xmlns:ahyp="http://schemas.microsoft.com/office/drawing/2018/hyperlinkcolor" val="tx"/>
                     </a:ext>
                   </a:extLst>
                 </a:hlinkClick>

</xml_diff>